<commit_message>
update presentation demo link
</commit_message>
<xml_diff>
--- a/Presentation1.pptx
+++ b/Presentation1.pptx
@@ -8,7 +8,8 @@
     <p:sldId id="256" r:id="rId2"/>
     <p:sldId id="257" r:id="rId3"/>
     <p:sldId id="259" r:id="rId4"/>
-    <p:sldId id="258" r:id="rId5"/>
+    <p:sldId id="260" r:id="rId5"/>
+    <p:sldId id="258" r:id="rId6"/>
   </p:sldIdLst>
   <p:sldSz cx="12192000" cy="6858000"/>
   <p:notesSz cx="6858000" cy="9144000"/>
@@ -107,6 +108,11 @@
       </a:defRPr>
     </a:lvl9pPr>
   </p:defaultTextStyle>
+  <p:extLst>
+    <p:ext uri="{EFAFB233-063F-42B5-8137-9DF3F51BA10A}">
+      <p15:sldGuideLst xmlns:p15="http://schemas.microsoft.com/office/powerpoint/2012/main"/>
+    </p:ext>
+  </p:extLst>
 </p:presentation>
 </file>
 
@@ -5068,6 +5074,350 @@
         <p:cNvPr id="1" name="">
           <a:extLst>
             <a:ext uri="{FF2B5EF4-FFF2-40B4-BE49-F238E27FC236}">
+              <a16:creationId xmlns:a16="http://schemas.microsoft.com/office/drawing/2014/main" id="{8CA7B0A9-9716-CBA3-36BB-A42393FB2CBE}"/>
+            </a:ext>
+          </a:extLst>
+        </p:cNvPr>
+        <p:cNvGrpSpPr/>
+        <p:nvPr/>
+      </p:nvGrpSpPr>
+      <p:grpSpPr>
+        <a:xfrm>
+          <a:off x="0" y="0"/>
+          <a:ext cx="0" cy="0"/>
+          <a:chOff x="0" y="0"/>
+          <a:chExt cx="0" cy="0"/>
+        </a:xfrm>
+      </p:grpSpPr>
+      <p:sp useBgFill="1">
+        <p:nvSpPr>
+          <p:cNvPr id="1031" name="Rectangle 1030">
+            <a:extLst>
+              <a:ext uri="{FF2B5EF4-FFF2-40B4-BE49-F238E27FC236}">
+                <a16:creationId xmlns:a16="http://schemas.microsoft.com/office/drawing/2014/main" id="{73F89456-E953-4AF8-8AEC-549B8DB1F464}"/>
+              </a:ext>
+              <a:ext uri="{C183D7F6-B498-43B3-948B-1728B52AA6E4}">
+                <adec:decorative xmlns:adec="http://schemas.microsoft.com/office/drawing/2017/decorative" val="1"/>
+              </a:ext>
+            </a:extLst>
+          </p:cNvPr>
+          <p:cNvSpPr>
+            <a:spLocks noGrp="1" noRot="1" noChangeAspect="1" noMove="1" noResize="1" noEditPoints="1" noAdjustHandles="1" noChangeArrowheads="1" noChangeShapeType="1" noTextEdit="1"/>
+          </p:cNvSpPr>
+          <p:nvPr>
+            <p:extLst>
+              <p:ext uri="{386F3935-93C4-4BCD-93E2-E3B085C9AB24}">
+                <p16:designElem xmlns:p16="http://schemas.microsoft.com/office/powerpoint/2015/main" val="1"/>
+              </p:ext>
+            </p:extLst>
+          </p:nvPr>
+        </p:nvSpPr>
+        <p:spPr>
+          <a:xfrm>
+            <a:off x="-1" y="0"/>
+            <a:ext cx="12188952" cy="6858000"/>
+          </a:xfrm>
+          <a:prstGeom prst="rect">
+            <a:avLst/>
+          </a:prstGeom>
+          <a:ln>
+            <a:noFill/>
+          </a:ln>
+        </p:spPr>
+        <p:style>
+          <a:lnRef idx="2">
+            <a:schemeClr val="accent1">
+              <a:shade val="50000"/>
+            </a:schemeClr>
+          </a:lnRef>
+          <a:fillRef idx="1">
+            <a:schemeClr val="accent1"/>
+          </a:fillRef>
+          <a:effectRef idx="0">
+            <a:schemeClr val="accent1"/>
+          </a:effectRef>
+          <a:fontRef idx="minor">
+            <a:schemeClr val="lt1"/>
+          </a:fontRef>
+        </p:style>
+        <p:txBody>
+          <a:bodyPr rtlCol="0" anchor="ctr"/>
+          <a:lstStyle/>
+          <a:p>
+            <a:pPr algn="ctr"/>
+            <a:endParaRPr lang="en-US"/>
+          </a:p>
+        </p:txBody>
+      </p:sp>
+      <p:sp>
+        <p:nvSpPr>
+          <p:cNvPr id="1033" name="Rectangle 1032">
+            <a:extLst>
+              <a:ext uri="{FF2B5EF4-FFF2-40B4-BE49-F238E27FC236}">
+                <a16:creationId xmlns:a16="http://schemas.microsoft.com/office/drawing/2014/main" id="{13D4533A-31BD-2E30-40C3-11069C79020E}"/>
+              </a:ext>
+              <a:ext uri="{C183D7F6-B498-43B3-948B-1728B52AA6E4}">
+                <adec:decorative xmlns:adec="http://schemas.microsoft.com/office/drawing/2017/decorative" val="1"/>
+              </a:ext>
+            </a:extLst>
+          </p:cNvPr>
+          <p:cNvSpPr>
+            <a:spLocks noGrp="1" noRot="1" noChangeAspect="1" noMove="1" noResize="1" noEditPoints="1" noAdjustHandles="1" noChangeArrowheads="1" noChangeShapeType="1" noTextEdit="1"/>
+          </p:cNvSpPr>
+          <p:nvPr>
+            <p:extLst>
+              <p:ext uri="{386F3935-93C4-4BCD-93E2-E3B085C9AB24}">
+                <p16:designElem xmlns:p16="http://schemas.microsoft.com/office/powerpoint/2015/main" val="1"/>
+              </p:ext>
+            </p:extLst>
+          </p:nvPr>
+        </p:nvSpPr>
+        <p:spPr>
+          <a:xfrm rot="16200000">
+            <a:off x="-1103377" y="1100316"/>
+            <a:ext cx="6858003" cy="4657347"/>
+          </a:xfrm>
+          <a:prstGeom prst="rect">
+            <a:avLst/>
+          </a:prstGeom>
+          <a:gradFill flip="none" rotWithShape="1">
+            <a:gsLst>
+              <a:gs pos="48000">
+                <a:srgbClr val="000000">
+                  <a:alpha val="24000"/>
+                </a:srgbClr>
+              </a:gs>
+              <a:gs pos="85000">
+                <a:srgbClr val="000000">
+                  <a:alpha val="45000"/>
+                </a:srgbClr>
+              </a:gs>
+              <a:gs pos="0">
+                <a:srgbClr val="000000">
+                  <a:alpha val="0"/>
+                </a:srgbClr>
+              </a:gs>
+            </a:gsLst>
+            <a:lin ang="16200000" scaled="1"/>
+            <a:tileRect/>
+          </a:gradFill>
+          <a:ln>
+            <a:noFill/>
+          </a:ln>
+        </p:spPr>
+        <p:style>
+          <a:lnRef idx="2">
+            <a:schemeClr val="accent1">
+              <a:shade val="50000"/>
+            </a:schemeClr>
+          </a:lnRef>
+          <a:fillRef idx="1">
+            <a:schemeClr val="accent1"/>
+          </a:fillRef>
+          <a:effectRef idx="0">
+            <a:schemeClr val="accent1"/>
+          </a:effectRef>
+          <a:fontRef idx="minor">
+            <a:schemeClr val="lt1"/>
+          </a:fontRef>
+        </p:style>
+        <p:txBody>
+          <a:bodyPr rtlCol="0" anchor="ctr"/>
+          <a:lstStyle/>
+          <a:p>
+            <a:pPr algn="ctr"/>
+            <a:endParaRPr lang="en-US"/>
+          </a:p>
+        </p:txBody>
+      </p:sp>
+      <p:sp>
+        <p:nvSpPr>
+          <p:cNvPr id="2" name="Title 1">
+            <a:extLst>
+              <a:ext uri="{FF2B5EF4-FFF2-40B4-BE49-F238E27FC236}">
+                <a16:creationId xmlns:a16="http://schemas.microsoft.com/office/drawing/2014/main" id="{FE26EA54-AD3C-55B1-6213-FE586F71AACC}"/>
+              </a:ext>
+            </a:extLst>
+          </p:cNvPr>
+          <p:cNvSpPr>
+            <a:spLocks noGrp="1"/>
+          </p:cNvSpPr>
+          <p:nvPr>
+            <p:ph type="ctrTitle"/>
+          </p:nvPr>
+        </p:nvSpPr>
+        <p:spPr>
+          <a:xfrm>
+            <a:off x="2318850" y="417105"/>
+            <a:ext cx="7551249" cy="744183"/>
+          </a:xfrm>
+        </p:spPr>
+        <p:txBody>
+          <a:bodyPr anchor="t">
+            <a:normAutofit fontScale="90000"/>
+          </a:bodyPr>
+          <a:lstStyle/>
+          <a:p>
+            <a:r>
+              <a:rPr lang="en-US" sz="5200" b="1" dirty="0">
+                <a:latin typeface="Monaco" pitchFamily="2" charset="77"/>
+              </a:rPr>
+              <a:t>Demo</a:t>
+            </a:r>
+          </a:p>
+        </p:txBody>
+      </p:sp>
+      <p:sp>
+        <p:nvSpPr>
+          <p:cNvPr id="1035" name="Rectangle 1034">
+            <a:extLst>
+              <a:ext uri="{FF2B5EF4-FFF2-40B4-BE49-F238E27FC236}">
+                <a16:creationId xmlns:a16="http://schemas.microsoft.com/office/drawing/2014/main" id="{283D993D-7B7C-237D-7D4A-F09A3D0CF9F9}"/>
+              </a:ext>
+              <a:ext uri="{C183D7F6-B498-43B3-948B-1728B52AA6E4}">
+                <adec:decorative xmlns:adec="http://schemas.microsoft.com/office/drawing/2017/decorative" val="1"/>
+              </a:ext>
+            </a:extLst>
+          </p:cNvPr>
+          <p:cNvSpPr>
+            <a:spLocks noGrp="1" noRot="1" noChangeAspect="1" noMove="1" noResize="1" noEditPoints="1" noAdjustHandles="1" noChangeArrowheads="1" noChangeShapeType="1" noTextEdit="1"/>
+          </p:cNvSpPr>
+          <p:nvPr>
+            <p:extLst>
+              <p:ext uri="{386F3935-93C4-4BCD-93E2-E3B085C9AB24}">
+                <p16:designElem xmlns:p16="http://schemas.microsoft.com/office/powerpoint/2015/main" val="1"/>
+              </p:ext>
+            </p:extLst>
+          </p:nvPr>
+        </p:nvSpPr>
+        <p:spPr>
+          <a:xfrm rot="5400000">
+            <a:off x="7540187" y="2206184"/>
+            <a:ext cx="6858003" cy="2445624"/>
+          </a:xfrm>
+          <a:prstGeom prst="rect">
+            <a:avLst/>
+          </a:prstGeom>
+          <a:gradFill flip="none" rotWithShape="1">
+            <a:gsLst>
+              <a:gs pos="48000">
+                <a:srgbClr val="000000">
+                  <a:alpha val="24000"/>
+                </a:srgbClr>
+              </a:gs>
+              <a:gs pos="85000">
+                <a:srgbClr val="000000">
+                  <a:alpha val="45000"/>
+                </a:srgbClr>
+              </a:gs>
+              <a:gs pos="0">
+                <a:srgbClr val="000000">
+                  <a:alpha val="0"/>
+                </a:srgbClr>
+              </a:gs>
+            </a:gsLst>
+            <a:lin ang="16200000" scaled="1"/>
+            <a:tileRect/>
+          </a:gradFill>
+          <a:ln>
+            <a:noFill/>
+          </a:ln>
+        </p:spPr>
+        <p:style>
+          <a:lnRef idx="2">
+            <a:schemeClr val="accent1">
+              <a:shade val="50000"/>
+            </a:schemeClr>
+          </a:lnRef>
+          <a:fillRef idx="1">
+            <a:schemeClr val="accent1"/>
+          </a:fillRef>
+          <a:effectRef idx="0">
+            <a:schemeClr val="accent1"/>
+          </a:effectRef>
+          <a:fontRef idx="minor">
+            <a:schemeClr val="lt1"/>
+          </a:fontRef>
+        </p:style>
+        <p:txBody>
+          <a:bodyPr rtlCol="0" anchor="ctr"/>
+          <a:lstStyle/>
+          <a:p>
+            <a:pPr algn="ctr"/>
+            <a:endParaRPr lang="en-US"/>
+          </a:p>
+        </p:txBody>
+      </p:sp>
+      <p:sp>
+        <p:nvSpPr>
+          <p:cNvPr id="3" name="TextBox 2">
+            <a:extLst>
+              <a:ext uri="{FF2B5EF4-FFF2-40B4-BE49-F238E27FC236}">
+                <a16:creationId xmlns:a16="http://schemas.microsoft.com/office/drawing/2014/main" id="{C83AFABF-3B61-3259-1C38-4B359B0AB96F}"/>
+              </a:ext>
+            </a:extLst>
+          </p:cNvPr>
+          <p:cNvSpPr txBox="1"/>
+          <p:nvPr/>
+        </p:nvSpPr>
+        <p:spPr>
+          <a:xfrm>
+            <a:off x="4269309" y="1828800"/>
+            <a:ext cx="3268395" cy="646331"/>
+          </a:xfrm>
+          <a:prstGeom prst="rect">
+            <a:avLst/>
+          </a:prstGeom>
+          <a:noFill/>
+        </p:spPr>
+        <p:txBody>
+          <a:bodyPr wrap="none" rtlCol="0">
+            <a:spAutoFit/>
+          </a:bodyPr>
+          <a:lstStyle/>
+          <a:p>
+            <a:r>
+              <a:rPr lang="en-US" dirty="0">
+                <a:hlinkClick r:id="rId2"/>
+              </a:rPr>
+              <a:t>https://youtu.be/CKVScKptAec</a:t>
+            </a:r>
+            <a:endParaRPr lang="en-US" dirty="0"/>
+          </a:p>
+          <a:p>
+            <a:endParaRPr lang="en-US" dirty="0"/>
+          </a:p>
+        </p:txBody>
+      </p:sp>
+    </p:spTree>
+    <p:extLst>
+      <p:ext uri="{BB962C8B-B14F-4D97-AF65-F5344CB8AC3E}">
+        <p14:creationId xmlns:p14="http://schemas.microsoft.com/office/powerpoint/2010/main" val="2063722496"/>
+      </p:ext>
+    </p:extLst>
+  </p:cSld>
+  <p:clrMapOvr>
+    <a:masterClrMapping/>
+  </p:clrMapOvr>
+</p:sld>
+</file>
+
+<file path=ppt/slides/slide5.xml><?xml version="1.0" encoding="utf-8"?>
+<p:sld xmlns:a="http://schemas.openxmlformats.org/drawingml/2006/main" xmlns:r="http://schemas.openxmlformats.org/officeDocument/2006/relationships" xmlns:p="http://schemas.openxmlformats.org/presentationml/2006/main">
+  <p:cSld>
+    <p:bg>
+      <p:bgPr>
+        <a:solidFill>
+          <a:schemeClr val="bg1"/>
+        </a:solidFill>
+        <a:effectLst/>
+      </p:bgPr>
+    </p:bg>
+    <p:spTree>
+      <p:nvGrpSpPr>
+        <p:cNvPr id="1" name="">
+          <a:extLst>
+            <a:ext uri="{FF2B5EF4-FFF2-40B4-BE49-F238E27FC236}">
               <a16:creationId xmlns:a16="http://schemas.microsoft.com/office/drawing/2014/main" id="{F160CC29-B5E5-E9BB-4388-055DB77A6D5B}"/>
             </a:ext>
           </a:extLst>

</xml_diff>